<commit_message>
new logos for notifications
</commit_message>
<xml_diff>
--- a/Showcase Presentation.pptx
+++ b/Showcase Presentation.pptx
@@ -8,7 +8,7 @@
     <p:notesMasterId r:id="rId6"/>
   </p:notesMasterIdLst>
   <p:sldIdLst>
-    <p:sldId id="257" r:id="rId2"/>
+    <p:sldId id="265" r:id="rId2"/>
     <p:sldId id="261" r:id="rId3"/>
     <p:sldId id="263" r:id="rId4"/>
     <p:sldId id="264" r:id="rId5"/>
@@ -558,7 +558,7 @@
     </p:spTree>
     <p:extLst>
       <p:ext uri="{BB962C8B-B14F-4D97-AF65-F5344CB8AC3E}">
-        <p14:creationId xmlns:p14="http://schemas.microsoft.com/office/powerpoint/2010/main" val="1323080872"/>
+        <p14:creationId xmlns:p14="http://schemas.microsoft.com/office/powerpoint/2010/main" val="3879846236"/>
       </p:ext>
     </p:extLst>
   </p:cSld>
@@ -659,81 +659,6 @@
 </file>
 
 <file path=ppt/slideLayouts/slideLayout2.xml><?xml version="1.0" encoding="utf-8"?>
-<p:sldLayout xmlns:a="http://schemas.openxmlformats.org/drawingml/2006/main" xmlns:r="http://schemas.openxmlformats.org/officeDocument/2006/relationships" xmlns:p="http://schemas.openxmlformats.org/presentationml/2006/main">
-  <p:cSld name="3_Blank">
-    <p:spTree>
-      <p:nvGrpSpPr>
-        <p:cNvPr id="1" name=""/>
-        <p:cNvGrpSpPr/>
-        <p:nvPr/>
-      </p:nvGrpSpPr>
-      <p:grpSpPr>
-        <a:xfrm>
-          <a:off x="0" y="0"/>
-          <a:ext cx="0" cy="0"/>
-          <a:chOff x="0" y="0"/>
-          <a:chExt cx="0" cy="0"/>
-        </a:xfrm>
-      </p:grpSpPr>
-      <p:sp>
-        <p:nvSpPr>
-          <p:cNvPr id="4" name="Picture Placeholder 13"/>
-          <p:cNvSpPr>
-            <a:spLocks noGrp="1"/>
-          </p:cNvSpPr>
-          <p:nvPr>
-            <p:ph type="pic" sz="quarter" idx="13"/>
-          </p:nvPr>
-        </p:nvSpPr>
-        <p:spPr>
-          <a:xfrm>
-            <a:off x="4" y="0"/>
-            <a:ext cx="24387174" cy="13716000"/>
-          </a:xfrm>
-          <a:effectLst/>
-        </p:spPr>
-        <p:txBody>
-          <a:bodyPr>
-            <a:normAutofit/>
-          </a:bodyPr>
-          <a:lstStyle>
-            <a:lvl1pPr marL="0" indent="0">
-              <a:buNone/>
-              <a:defRPr sz="4200">
-                <a:ln>
-                  <a:noFill/>
-                </a:ln>
-                <a:solidFill>
-                  <a:schemeClr val="bg1">
-                    <a:lumMod val="85000"/>
-                  </a:schemeClr>
-                </a:solidFill>
-              </a:defRPr>
-            </a:lvl1pPr>
-          </a:lstStyle>
-          <a:p>
-            <a:r>
-              <a:rPr lang="en-US"/>
-              <a:t>Drag picture to placeholder or click icon to add</a:t>
-            </a:r>
-            <a:endParaRPr lang="en-US" dirty="0"/>
-          </a:p>
-        </p:txBody>
-      </p:sp>
-    </p:spTree>
-    <p:extLst>
-      <p:ext uri="{BB962C8B-B14F-4D97-AF65-F5344CB8AC3E}">
-        <p14:creationId xmlns:p14="http://schemas.microsoft.com/office/powerpoint/2010/main" val="283799541"/>
-      </p:ext>
-    </p:extLst>
-  </p:cSld>
-  <p:clrMapOvr>
-    <a:masterClrMapping/>
-  </p:clrMapOvr>
-</p:sldLayout>
-</file>
-
-<file path=ppt/slideLayouts/slideLayout3.xml><?xml version="1.0" encoding="utf-8"?>
 <p:sldLayout xmlns:a="http://schemas.openxmlformats.org/drawingml/2006/main" xmlns:r="http://schemas.openxmlformats.org/officeDocument/2006/relationships" xmlns:p="http://schemas.openxmlformats.org/presentationml/2006/main" userDrawn="1">
   <p:cSld name="1_PlaceholderIMG">
     <p:spTree>
@@ -910,7 +835,7 @@
 </p:sldLayout>
 </file>
 
-<file path=ppt/slideLayouts/slideLayout4.xml><?xml version="1.0" encoding="utf-8"?>
+<file path=ppt/slideLayouts/slideLayout3.xml><?xml version="1.0" encoding="utf-8"?>
 <p:sldLayout xmlns:a="http://schemas.openxmlformats.org/drawingml/2006/main" xmlns:r="http://schemas.openxmlformats.org/officeDocument/2006/relationships" xmlns:p="http://schemas.openxmlformats.org/presentationml/2006/main" userDrawn="1">
   <p:cSld name="18_Blank">
     <p:spTree>
@@ -1039,6 +964,81 @@
 </p:sldLayout>
 </file>
 
+<file path=ppt/slideLayouts/slideLayout4.xml><?xml version="1.0" encoding="utf-8"?>
+<p:sldLayout xmlns:a="http://schemas.openxmlformats.org/drawingml/2006/main" xmlns:r="http://schemas.openxmlformats.org/officeDocument/2006/relationships" xmlns:p="http://schemas.openxmlformats.org/presentationml/2006/main">
+  <p:cSld name="3_Blank">
+    <p:spTree>
+      <p:nvGrpSpPr>
+        <p:cNvPr id="1" name=""/>
+        <p:cNvGrpSpPr/>
+        <p:nvPr/>
+      </p:nvGrpSpPr>
+      <p:grpSpPr>
+        <a:xfrm>
+          <a:off x="0" y="0"/>
+          <a:ext cx="0" cy="0"/>
+          <a:chOff x="0" y="0"/>
+          <a:chExt cx="0" cy="0"/>
+        </a:xfrm>
+      </p:grpSpPr>
+      <p:sp>
+        <p:nvSpPr>
+          <p:cNvPr id="4" name="Picture Placeholder 13"/>
+          <p:cNvSpPr>
+            <a:spLocks noGrp="1"/>
+          </p:cNvSpPr>
+          <p:nvPr>
+            <p:ph type="pic" sz="quarter" idx="13"/>
+          </p:nvPr>
+        </p:nvSpPr>
+        <p:spPr>
+          <a:xfrm>
+            <a:off x="4" y="0"/>
+            <a:ext cx="24387174" cy="13716000"/>
+          </a:xfrm>
+          <a:effectLst/>
+        </p:spPr>
+        <p:txBody>
+          <a:bodyPr>
+            <a:normAutofit/>
+          </a:bodyPr>
+          <a:lstStyle>
+            <a:lvl1pPr marL="0" indent="0">
+              <a:buNone/>
+              <a:defRPr sz="4200">
+                <a:ln>
+                  <a:noFill/>
+                </a:ln>
+                <a:solidFill>
+                  <a:schemeClr val="bg1">
+                    <a:lumMod val="85000"/>
+                  </a:schemeClr>
+                </a:solidFill>
+              </a:defRPr>
+            </a:lvl1pPr>
+          </a:lstStyle>
+          <a:p>
+            <a:r>
+              <a:rPr lang="en-US"/>
+              <a:t>Drag picture to placeholder or click icon to add</a:t>
+            </a:r>
+            <a:endParaRPr lang="en-US" dirty="0"/>
+          </a:p>
+        </p:txBody>
+      </p:sp>
+    </p:spTree>
+    <p:extLst>
+      <p:ext uri="{BB962C8B-B14F-4D97-AF65-F5344CB8AC3E}">
+        <p14:creationId xmlns:p14="http://schemas.microsoft.com/office/powerpoint/2010/main" val="2796199473"/>
+      </p:ext>
+    </p:extLst>
+  </p:cSld>
+  <p:clrMapOvr>
+    <a:masterClrMapping/>
+  </p:clrMapOvr>
+</p:sldLayout>
+</file>
+
 <file path=ppt/slideMasters/slideMaster1.xml><?xml version="1.0" encoding="utf-8"?>
 <p:sldMaster xmlns:a="http://schemas.openxmlformats.org/drawingml/2006/main" xmlns:r="http://schemas.openxmlformats.org/officeDocument/2006/relationships" xmlns:p="http://schemas.openxmlformats.org/presentationml/2006/main">
   <p:cSld>
@@ -1285,9 +1285,9 @@
   <p:clrMap bg1="lt1" tx1="dk1" bg2="lt2" tx2="dk2" accent1="accent1" accent2="accent2" accent3="accent3" accent4="accent4" accent5="accent5" accent6="accent6" hlink="hlink" folHlink="folHlink"/>
   <p:sldLayoutIdLst>
     <p:sldLayoutId id="2147483667" r:id="rId1"/>
-    <p:sldLayoutId id="2147483672" r:id="rId2"/>
-    <p:sldLayoutId id="2147483676" r:id="rId3"/>
-    <p:sldLayoutId id="2147483677" r:id="rId4"/>
+    <p:sldLayoutId id="2147483676" r:id="rId2"/>
+    <p:sldLayoutId id="2147483677" r:id="rId3"/>
+    <p:sldLayoutId id="2147483678" r:id="rId4"/>
   </p:sldLayoutIdLst>
   <p:txStyles>
     <p:titleStyle>
@@ -1591,21 +1591,86 @@
       </p:grpSpPr>
       <p:sp>
         <p:nvSpPr>
-          <p:cNvPr id="2" name="Picture Placeholder 1"/>
-          <p:cNvSpPr>
-            <a:spLocks noGrp="1"/>
-          </p:cNvSpPr>
+          <p:cNvPr id="5" name="Rectangle 4">
+            <a:extLst>
+              <a:ext uri="{FF2B5EF4-FFF2-40B4-BE49-F238E27FC236}">
+                <a16:creationId xmlns:a16="http://schemas.microsoft.com/office/drawing/2014/main" id="{D1B2879B-80BD-41D5-90FB-114401CFDB6A}"/>
+              </a:ext>
+            </a:extLst>
+          </p:cNvPr>
+          <p:cNvSpPr/>
+          <p:nvPr/>
+        </p:nvSpPr>
+        <p:spPr>
+          <a:xfrm>
+            <a:off x="1587" y="895"/>
+            <a:ext cx="24384000" cy="13714214"/>
+          </a:xfrm>
+          <a:prstGeom prst="rect">
+            <a:avLst/>
+          </a:prstGeom>
+          <a:solidFill>
+            <a:srgbClr val="42C0FB"/>
+          </a:solidFill>
+          <a:ln>
+            <a:solidFill>
+              <a:srgbClr val="42C0FB"/>
+            </a:solidFill>
+          </a:ln>
+        </p:spPr>
+        <p:style>
+          <a:lnRef idx="2">
+            <a:schemeClr val="accent1">
+              <a:shade val="50000"/>
+            </a:schemeClr>
+          </a:lnRef>
+          <a:fillRef idx="1">
+            <a:schemeClr val="accent1"/>
+          </a:fillRef>
+          <a:effectRef idx="0">
+            <a:schemeClr val="accent1"/>
+          </a:effectRef>
+          <a:fontRef idx="minor">
+            <a:schemeClr val="lt1"/>
+          </a:fontRef>
+        </p:style>
+        <p:txBody>
+          <a:bodyPr rtlCol="0" anchor="ctr"/>
+          <a:lstStyle/>
+          <a:p>
+            <a:pPr algn="ctr"/>
+            <a:endParaRPr lang="en-GB" sz="1800"/>
+          </a:p>
+        </p:txBody>
+      </p:sp>
+      <p:pic>
+        <p:nvPicPr>
+          <p:cNvPr id="4" name="Picture Placeholder 3" descr="A close up of a sign&#10;&#10;Description generated with high confidence">
+            <a:extLst>
+              <a:ext uri="{FF2B5EF4-FFF2-40B4-BE49-F238E27FC236}">
+                <a16:creationId xmlns:a16="http://schemas.microsoft.com/office/drawing/2014/main" id="{3FE02A14-0AA4-4F60-90E8-24267DA32B5A}"/>
+              </a:ext>
+            </a:extLst>
+          </p:cNvPr>
+          <p:cNvPicPr>
+            <a:picLocks noGrp="1" noChangeAspect="1"/>
+          </p:cNvPicPr>
           <p:nvPr>
             <p:ph type="pic" sz="quarter" idx="13"/>
           </p:nvPr>
-        </p:nvSpPr>
+        </p:nvPicPr>
+        <p:blipFill rotWithShape="1">
+          <a:blip r:embed="rId3"/>
+          <a:srcRect l="9909" t="20393" r="9537" b="20393"/>
+          <a:stretch/>
+        </p:blipFill>
         <p:spPr>
           <a:xfrm>
-            <a:off x="4" y="0"/>
-            <a:ext cx="24382408" cy="13716000"/>
+            <a:off x="2352598" y="895"/>
+            <a:ext cx="19112826" cy="13714214"/>
           </a:xfrm>
         </p:spPr>
-      </p:sp>
+      </p:pic>
       <p:sp>
         <p:nvSpPr>
           <p:cNvPr id="12" name="Rectangle 11"/>
@@ -1614,8 +1679,8 @@
         </p:nvSpPr>
         <p:spPr>
           <a:xfrm>
-            <a:off x="4762" y="0"/>
-            <a:ext cx="24377650" cy="13716002"/>
+            <a:off x="-50351" y="895"/>
+            <a:ext cx="24435940" cy="13714214"/>
           </a:xfrm>
           <a:prstGeom prst="rect">
             <a:avLst/>
@@ -1650,7 +1715,7 @@
           <a:lstStyle/>
           <a:p>
             <a:pPr algn="ctr"/>
-            <a:endParaRPr lang="en-US">
+            <a:endParaRPr lang="en-US" sz="1800">
               <a:latin typeface="Lato Light" charset="0"/>
             </a:endParaRPr>
           </a:p>
@@ -1664,8 +1729,8 @@
         </p:nvSpPr>
         <p:spPr>
           <a:xfrm>
-            <a:off x="6070975" y="5280645"/>
-            <a:ext cx="12141337" cy="3154710"/>
+            <a:off x="6630849" y="5280851"/>
+            <a:ext cx="11021607" cy="3154069"/>
           </a:xfrm>
           <a:prstGeom prst="rect">
             <a:avLst/>
@@ -1680,7 +1745,7 @@
           <a:p>
             <a:pPr algn="ctr"/>
             <a:r>
-              <a:rPr lang="en-US" sz="19900" dirty="0" smtClean="0">
+              <a:rPr lang="en-US" sz="19896" dirty="0">
                 <a:solidFill>
                   <a:schemeClr val="bg1"/>
                 </a:solidFill>
@@ -1690,7 +1755,7 @@
               </a:rPr>
               <a:t>TrackPack</a:t>
             </a:r>
-            <a:endParaRPr lang="en-US" sz="16600" dirty="0">
+            <a:endParaRPr lang="en-US" sz="16596" dirty="0">
               <a:solidFill>
                 <a:schemeClr val="bg1"/>
               </a:solidFill>
@@ -1709,8 +1774,8 @@
         </p:nvSpPr>
         <p:spPr>
           <a:xfrm>
-            <a:off x="8780297" y="10198162"/>
-            <a:ext cx="6722691" cy="646331"/>
+            <a:off x="8780741" y="10197729"/>
+            <a:ext cx="6721816" cy="369332"/>
           </a:xfrm>
           <a:prstGeom prst="rect">
             <a:avLst/>
@@ -1725,7 +1790,7 @@
           <a:p>
             <a:pPr algn="ctr"/>
             <a:r>
-              <a:rPr lang="en-US" spc="600" dirty="0" smtClean="0">
+              <a:rPr lang="en-US" sz="1800" spc="600" dirty="0">
                 <a:solidFill>
                   <a:schemeClr val="bg1"/>
                 </a:solidFill>
@@ -1735,14 +1800,6 @@
               </a:rPr>
               <a:t>Keeping your child safe</a:t>
             </a:r>
-            <a:endParaRPr lang="en-US" spc="600" dirty="0">
-              <a:solidFill>
-                <a:schemeClr val="bg1"/>
-              </a:solidFill>
-              <a:latin typeface="Lato Light" charset="0"/>
-              <a:ea typeface="Lato Light" charset="0"/>
-              <a:cs typeface="Lato Light" charset="0"/>
-            </a:endParaRPr>
           </a:p>
         </p:txBody>
       </p:sp>
@@ -1756,13 +1813,6 @@
   <p:clrMapOvr>
     <a:masterClrMapping/>
   </p:clrMapOvr>
-  <p:timing>
-    <p:tnLst>
-      <p:par>
-        <p:cTn id="1" dur="indefinite" restart="never" nodeType="tmRoot"/>
-      </p:par>
-    </p:tnLst>
-  </p:timing>
 </p:sld>
 </file>
 
@@ -1811,7 +1861,7 @@
               </a:lnSpc>
             </a:pPr>
             <a:r>
-              <a:rPr lang="en-US" sz="2600" dirty="0" smtClean="0">
+              <a:rPr lang="en-US" sz="2600" dirty="0">
                 <a:latin typeface="Lato Light" charset="0"/>
                 <a:ea typeface="Lato Light" charset="0"/>
                 <a:cs typeface="Lato Light" charset="0"/>
@@ -1902,18 +1952,13 @@
               </a:lnSpc>
             </a:pPr>
             <a:r>
-              <a:rPr lang="en-US" sz="2600" dirty="0" smtClean="0">
+              <a:rPr lang="en-US" sz="2600" dirty="0">
                 <a:latin typeface="Lato Light" charset="0"/>
                 <a:ea typeface="Lato Light" charset="0"/>
                 <a:cs typeface="Lato Light" charset="0"/>
               </a:rPr>
               <a:t>Is to combat the amount of children that are abducted every year and ensure safety of minors</a:t>
             </a:r>
-            <a:endParaRPr lang="en-US" sz="2600" dirty="0">
-              <a:latin typeface="Lato Light" charset="0"/>
-              <a:ea typeface="Lato Light" charset="0"/>
-              <a:cs typeface="Lato Light" charset="0"/>
-            </a:endParaRPr>
           </a:p>
         </p:txBody>
       </p:sp>
@@ -2027,50 +2072,13 @@
               </a:lnSpc>
             </a:pPr>
             <a:r>
-              <a:rPr lang="en-US" sz="2600" dirty="0" smtClean="0">
-                <a:latin typeface="Lato Light" charset="0"/>
-                <a:ea typeface="Lato Light" charset="0"/>
-                <a:cs typeface="Lato Light" charset="0"/>
-              </a:rPr>
-              <a:t>This device is straight forward and easy to set up and use. </a:t>
-            </a:r>
-            <a:r>
               <a:rPr lang="en-US" sz="2600" dirty="0">
                 <a:latin typeface="Lato Light" charset="0"/>
                 <a:ea typeface="Lato Light" charset="0"/>
                 <a:cs typeface="Lato Light" charset="0"/>
               </a:rPr>
-              <a:t>B</a:t>
+              <a:t>This device is straight forward and easy to set up and use. By utilizing the long range, low power wireless communication features of the Explorer, making it ideal for this job.</a:t>
             </a:r>
-            <a:r>
-              <a:rPr lang="en-US" sz="2600" dirty="0" smtClean="0">
-                <a:latin typeface="Lato Light" charset="0"/>
-                <a:ea typeface="Lato Light" charset="0"/>
-                <a:cs typeface="Lato Light" charset="0"/>
-              </a:rPr>
-              <a:t>y </a:t>
-            </a:r>
-            <a:r>
-              <a:rPr lang="en-US" sz="2600" dirty="0">
-                <a:latin typeface="Lato Light" charset="0"/>
-                <a:ea typeface="Lato Light" charset="0"/>
-                <a:cs typeface="Lato Light" charset="0"/>
-              </a:rPr>
-              <a:t>u</a:t>
-            </a:r>
-            <a:r>
-              <a:rPr lang="en-US" sz="2600" dirty="0" smtClean="0">
-                <a:latin typeface="Lato Light" charset="0"/>
-                <a:ea typeface="Lato Light" charset="0"/>
-                <a:cs typeface="Lato Light" charset="0"/>
-              </a:rPr>
-              <a:t>tilizing the long range, low power wireless communication features of the Explorer, making it ideal for this job.</a:t>
-            </a:r>
-            <a:endParaRPr lang="en-US" sz="2600" dirty="0">
-              <a:latin typeface="Lato Light" charset="0"/>
-              <a:ea typeface="Lato Light" charset="0"/>
-              <a:cs typeface="Lato Light" charset="0"/>
-            </a:endParaRPr>
           </a:p>
         </p:txBody>
       </p:sp>
@@ -3495,7 +3503,7 @@
           <a:lstStyle/>
           <a:p>
             <a:r>
-              <a:rPr lang="en-US" sz="7200" dirty="0" smtClean="0">
+              <a:rPr lang="en-US" sz="7200" dirty="0">
                 <a:solidFill>
                   <a:srgbClr val="00B0F0"/>
                 </a:solidFill>
@@ -3505,14 +3513,6 @@
               </a:rPr>
               <a:t>Peace of Mind</a:t>
             </a:r>
-            <a:endParaRPr lang="en-US" sz="7200" dirty="0">
-              <a:solidFill>
-                <a:srgbClr val="00B0F0"/>
-              </a:solidFill>
-              <a:latin typeface="Lato Light" charset="0"/>
-              <a:ea typeface="Lato Light" charset="0"/>
-              <a:cs typeface="Lato Light" charset="0"/>
-            </a:endParaRPr>
           </a:p>
         </p:txBody>
       </p:sp>
@@ -3539,34 +3539,13 @@
           <a:lstStyle/>
           <a:p>
             <a:r>
-              <a:rPr lang="en-GB" dirty="0" smtClean="0">
-                <a:solidFill>
-                  <a:srgbClr val="00B0F0"/>
-                </a:solidFill>
-              </a:rPr>
-              <a:t>The TrackPack is a piece of </a:t>
-            </a:r>
-            <a:r>
               <a:rPr lang="en-GB" dirty="0">
                 <a:solidFill>
                   <a:srgbClr val="00B0F0"/>
                 </a:solidFill>
               </a:rPr>
-              <a:t>safeguarding</a:t>
+              <a:t>The TrackPack is a piece of safeguarding technology that is handy and convenient to use and is aimed at parents</a:t>
             </a:r>
-            <a:r>
-              <a:rPr lang="en-GB" dirty="0" smtClean="0">
-                <a:solidFill>
-                  <a:srgbClr val="00B0F0"/>
-                </a:solidFill>
-              </a:rPr>
-              <a:t> technology that is handy and convenient to use and is aimed at parents</a:t>
-            </a:r>
-            <a:endParaRPr lang="en-GB" dirty="0">
-              <a:solidFill>
-                <a:srgbClr val="00B0F0"/>
-              </a:solidFill>
-            </a:endParaRPr>
           </a:p>
         </p:txBody>
       </p:sp>
@@ -3598,7 +3577,7 @@
               </a:lnSpc>
             </a:pPr>
             <a:r>
-              <a:rPr lang="en-US" sz="2600" dirty="0" smtClean="0">
+              <a:rPr lang="en-US" sz="2600" dirty="0">
                 <a:latin typeface="Lato Light" charset="0"/>
                 <a:ea typeface="Lato Light" charset="0"/>
                 <a:cs typeface="Lato Light" charset="0"/>
@@ -3618,13 +3597,6 @@
   <p:clrMapOvr>
     <a:masterClrMapping/>
   </p:clrMapOvr>
-  <p:timing>
-    <p:tnLst>
-      <p:par>
-        <p:cTn id="1" dur="indefinite" restart="never" nodeType="tmRoot"/>
-      </p:par>
-    </p:tnLst>
-  </p:timing>
 </p:sld>
 </file>
 
@@ -3673,7 +3645,7 @@
               </a:lnSpc>
             </a:pPr>
             <a:r>
-              <a:rPr lang="en-US" dirty="0" smtClean="0">
+              <a:rPr lang="en-US" dirty="0">
                 <a:solidFill>
                   <a:schemeClr val="tx2"/>
                 </a:solidFill>
@@ -3691,7 +3663,7 @@
               </a:lnSpc>
             </a:pPr>
             <a:r>
-              <a:rPr lang="en-US" sz="2800" dirty="0" smtClean="0">
+              <a:rPr lang="en-US" sz="2800" dirty="0">
                 <a:solidFill>
                   <a:srgbClr val="A3A3A3"/>
                 </a:solidFill>
@@ -3740,7 +3712,7 @@
               </a:lnSpc>
             </a:pPr>
             <a:r>
-              <a:rPr lang="en-US" sz="5400" dirty="0" smtClean="0">
+              <a:rPr lang="en-US" sz="5400" dirty="0">
                 <a:solidFill>
                   <a:schemeClr val="tx2"/>
                 </a:solidFill>
@@ -3758,7 +3730,7 @@
               </a:lnSpc>
             </a:pPr>
             <a:r>
-              <a:rPr lang="en-US" sz="2800" dirty="0" smtClean="0">
+              <a:rPr lang="en-US" sz="2800" dirty="0">
                 <a:solidFill>
                   <a:srgbClr val="ADADAD"/>
                 </a:solidFill>
@@ -3768,14 +3740,6 @@
               </a:rPr>
               <a:t>The Explorer will ping the co-ordinates every 5 minutes mapping the route of the owner. Furthermore you can map out the usual routes you would take for example: Going to school or going to the shops.</a:t>
             </a:r>
-            <a:endParaRPr lang="en-US" sz="2800" dirty="0">
-              <a:solidFill>
-                <a:srgbClr val="ADADAD"/>
-              </a:solidFill>
-              <a:latin typeface="Lato Light" charset="0"/>
-              <a:ea typeface="Lato Light" charset="0"/>
-              <a:cs typeface="Lato Light" charset="0"/>
-            </a:endParaRPr>
           </a:p>
         </p:txBody>
       </p:sp>
@@ -3807,7 +3771,7 @@
               </a:lnSpc>
             </a:pPr>
             <a:r>
-              <a:rPr lang="en-US" dirty="0" smtClean="0">
+              <a:rPr lang="en-US" dirty="0">
                 <a:solidFill>
                   <a:schemeClr val="tx2"/>
                 </a:solidFill>
@@ -3817,14 +3781,6 @@
               </a:rPr>
               <a:t>Compared with crime stats</a:t>
             </a:r>
-            <a:endParaRPr lang="en-US" dirty="0">
-              <a:solidFill>
-                <a:schemeClr val="tx2"/>
-              </a:solidFill>
-              <a:latin typeface="Lato Light" charset="0"/>
-              <a:ea typeface="Lato Light" charset="0"/>
-              <a:cs typeface="Lato Light" charset="0"/>
-            </a:endParaRPr>
           </a:p>
           <a:p>
             <a:pPr algn="ctr">
@@ -3838,23 +3794,7 @@
                 <a:ea typeface="Lato Light" charset="0"/>
                 <a:cs typeface="Lato Light" charset="0"/>
               </a:rPr>
-              <a:t>First: What is a Fast-Fish? Alive or dead a fish is technically fast, when it is connected with an occupied ship or boat, by any medium at all controllable by the </a:t>
-            </a:r>
-            <a:r>
-              <a:rPr lang="en-US" sz="2399" dirty="0" smtClean="0">
-                <a:latin typeface="Lato Light" charset="0"/>
-                <a:ea typeface="Lato Light" charset="0"/>
-                <a:cs typeface="Lato Light" charset="0"/>
-              </a:rPr>
-              <a:t>or </a:t>
-            </a:r>
-            <a:r>
-              <a:rPr lang="en-US" sz="2399" dirty="0">
-                <a:latin typeface="Lato Light" charset="0"/>
-                <a:ea typeface="Lato Light" charset="0"/>
-                <a:cs typeface="Lato Light" charset="0"/>
-              </a:rPr>
-              <a:t>occupants,—a mast, an oar, a nine-</a:t>
+              <a:t>First: What is a Fast-Fish? Alive or dead a fish is technically fast, when it is connected with an occupied ship or boat, by any medium at all controllable by the or occupants,—a mast, an oar, a nine-</a:t>
             </a:r>
             <a:r>
               <a:rPr lang="en-US" sz="2399" dirty="0" err="1">
@@ -3971,13 +3911,6 @@
   <p:clrMapOvr>
     <a:masterClrMapping/>
   </p:clrMapOvr>
-  <p:timing>
-    <p:tnLst>
-      <p:par>
-        <p:cTn id="1" dur="indefinite" restart="never" nodeType="tmRoot"/>
-      </p:par>
-    </p:tnLst>
-  </p:timing>
 </p:sld>
 </file>
 
@@ -4000,6 +3933,31 @@
       </p:grpSpPr>
       <p:pic>
         <p:nvPicPr>
+          <p:cNvPr id="6" name="Picture Placeholder 5" descr="A screenshot of a cell phone&#10;&#10;Description generated with very high confidence">
+            <a:extLst>
+              <a:ext uri="{FF2B5EF4-FFF2-40B4-BE49-F238E27FC236}">
+                <a16:creationId xmlns:a16="http://schemas.microsoft.com/office/drawing/2014/main" id="{D2CB239A-8DD6-4B31-B75F-4C05D4463D20}"/>
+              </a:ext>
+            </a:extLst>
+          </p:cNvPr>
+          <p:cNvPicPr>
+            <a:picLocks noGrp="1" noChangeAspect="1"/>
+          </p:cNvPicPr>
+          <p:nvPr>
+            <p:ph type="pic" sz="quarter" idx="27"/>
+          </p:nvPr>
+        </p:nvPicPr>
+        <p:blipFill>
+          <a:blip r:embed="rId2"/>
+          <a:srcRect t="156" b="156"/>
+          <a:stretch>
+            <a:fillRect/>
+          </a:stretch>
+        </p:blipFill>
+        <p:spPr/>
+      </p:pic>
+      <p:pic>
+        <p:nvPicPr>
           <p:cNvPr id="12" name="Picture 11" descr="iPhone6_mockup_front_white.png"/>
           <p:cNvPicPr>
             <a:picLocks noChangeAspect="1"/>
@@ -4007,7 +3965,7 @@
           <p:nvPr/>
         </p:nvPicPr>
         <p:blipFill rotWithShape="1">
-          <a:blip r:embed="rId2">
+          <a:blip r:embed="rId3">
             <a:extLst>
               <a:ext uri="{28A0092B-C50C-407E-A947-70E740481C1C}">
                 <a14:useLocalDpi xmlns:a14="http://schemas.microsoft.com/office/drawing/2010/main" val="0"/>
@@ -4027,56 +3985,6 @@
           </a:prstGeom>
         </p:spPr>
       </p:pic>
-      <p:sp>
-        <p:nvSpPr>
-          <p:cNvPr id="32" name="Rectangle 31"/>
-          <p:cNvSpPr/>
-          <p:nvPr/>
-        </p:nvSpPr>
-        <p:spPr>
-          <a:xfrm>
-            <a:off x="2387157" y="2904049"/>
-            <a:ext cx="4597139" cy="8102289"/>
-          </a:xfrm>
-          <a:prstGeom prst="rect">
-            <a:avLst/>
-          </a:prstGeom>
-          <a:solidFill>
-            <a:schemeClr val="bg1">
-              <a:lumMod val="50000"/>
-            </a:schemeClr>
-          </a:solidFill>
-          <a:ln>
-            <a:noFill/>
-          </a:ln>
-        </p:spPr>
-        <p:style>
-          <a:lnRef idx="2">
-            <a:schemeClr val="accent1">
-              <a:shade val="50000"/>
-            </a:schemeClr>
-          </a:lnRef>
-          <a:fillRef idx="1">
-            <a:schemeClr val="accent1"/>
-          </a:fillRef>
-          <a:effectRef idx="0">
-            <a:schemeClr val="accent1"/>
-          </a:effectRef>
-          <a:fontRef idx="minor">
-            <a:schemeClr val="lt1"/>
-          </a:fontRef>
-        </p:style>
-        <p:txBody>
-          <a:bodyPr rtlCol="0" anchor="ctr"/>
-          <a:lstStyle/>
-          <a:p>
-            <a:pPr algn="ctr"/>
-            <a:endParaRPr lang="en-US" dirty="0">
-              <a:latin typeface="Lato Light" charset="0"/>
-            </a:endParaRPr>
-          </a:p>
-        </p:txBody>
-      </p:sp>
       <p:sp>
         <p:nvSpPr>
           <p:cNvPr id="20" name="TextBox 19"/>
@@ -5118,37 +5026,32 @@
       </p:sp>
       <p:pic>
         <p:nvPicPr>
-          <p:cNvPr id="7" name="Picture Placeholder 6">
+          <p:cNvPr id="14" name="Picture 13" descr="A screenshot of a cell phone&#10;&#10;Description generated with very high confidence">
             <a:extLst>
               <a:ext uri="{FF2B5EF4-FFF2-40B4-BE49-F238E27FC236}">
-                <a16:creationId xmlns:a16="http://schemas.microsoft.com/office/drawing/2014/main" id="{BB9B5F6E-F307-4D32-99BC-FA49DF4D8A47}"/>
+                <a16:creationId xmlns:a16="http://schemas.microsoft.com/office/drawing/2014/main" id="{6DF5B7D3-A504-43D1-9A91-32BC94EC5621}"/>
               </a:ext>
             </a:extLst>
           </p:cNvPr>
           <p:cNvPicPr>
-            <a:picLocks noGrp="1" noChangeAspect="1"/>
+            <a:picLocks noChangeAspect="1"/>
           </p:cNvPicPr>
-          <p:nvPr>
-            <p:ph type="pic" sz="quarter" idx="27"/>
-          </p:nvPr>
+          <p:nvPr/>
         </p:nvPicPr>
         <p:blipFill>
-          <a:blip r:embed="rId3">
-            <a:extLst>
-              <a:ext uri="{28A0092B-C50C-407E-A947-70E740481C1C}">
-                <a14:useLocalDpi xmlns:a14="http://schemas.microsoft.com/office/drawing/2010/main" val="0"/>
-              </a:ext>
-            </a:extLst>
-          </a:blip>
+          <a:blip r:embed="rId4"/>
           <a:stretch>
             <a:fillRect/>
           </a:stretch>
         </p:blipFill>
         <p:spPr>
           <a:xfrm>
-            <a:off x="2388806" y="2904049"/>
-            <a:ext cx="4557537" cy="8102288"/>
+            <a:off x="2416699" y="2904048"/>
+            <a:ext cx="4557538" cy="8102289"/>
           </a:xfrm>
+          <a:prstGeom prst="rect">
+            <a:avLst/>
+          </a:prstGeom>
         </p:spPr>
       </p:pic>
       <p:pic>
@@ -5160,7 +5063,7 @@
           <p:nvPr/>
         </p:nvPicPr>
         <p:blipFill rotWithShape="1">
-          <a:blip r:embed="rId2">
+          <a:blip r:embed="rId3">
             <a:extLst>
               <a:ext uri="{28A0092B-C50C-407E-A947-70E740481C1C}">
                 <a14:useLocalDpi xmlns:a14="http://schemas.microsoft.com/office/drawing/2010/main" val="0"/>
@@ -5182,10 +5085,10 @@
       </p:pic>
       <p:pic>
         <p:nvPicPr>
-          <p:cNvPr id="5" name="Picture Placeholder 4">
+          <p:cNvPr id="18" name="Picture Placeholder 17">
             <a:extLst>
               <a:ext uri="{FF2B5EF4-FFF2-40B4-BE49-F238E27FC236}">
-                <a16:creationId xmlns:a16="http://schemas.microsoft.com/office/drawing/2014/main" id="{5513666A-2D60-4A6F-9B3F-EAB4F8E40F02}"/>
+                <a16:creationId xmlns:a16="http://schemas.microsoft.com/office/drawing/2014/main" id="{F54D2651-B483-43BB-AF15-EB687B1A2C53}"/>
               </a:ext>
             </a:extLst>
           </p:cNvPr>
@@ -5197,17 +5100,13 @@
           </p:nvPr>
         </p:nvPicPr>
         <p:blipFill>
-          <a:blip r:embed="rId4"/>
+          <a:blip r:embed="rId5"/>
+          <a:srcRect t="156" b="156"/>
           <a:stretch>
             <a:fillRect/>
           </a:stretch>
         </p:blipFill>
-        <p:spPr>
-          <a:xfrm>
-            <a:off x="5665446" y="2904049"/>
-            <a:ext cx="4557537" cy="8102289"/>
-          </a:xfrm>
-        </p:spPr>
+        <p:spPr/>
       </p:pic>
     </p:spTree>
     <p:extLst>
@@ -5219,13 +5118,6 @@
   <p:clrMapOvr>
     <a:masterClrMapping/>
   </p:clrMapOvr>
-  <p:timing>
-    <p:tnLst>
-      <p:par>
-        <p:cTn id="1" dur="indefinite" restart="never" nodeType="tmRoot"/>
-      </p:par>
-    </p:tnLst>
-  </p:timing>
 </p:sld>
 </file>
 

</xml_diff>